<commit_message>
mini cambio a portada
</commit_message>
<xml_diff>
--- a/clase5/teorica_5.pptx
+++ b/clase5/teorica_5.pptx
@@ -9611,8 +9611,13 @@
             </a:pPr>
             <a:r>
               <a:rPr lang="es-AR" dirty="0"/>
-              <a:t>Diplomatura en Ciencias Sociales Computacionales y Humanidades Digitales (IDAES-UNSAM) – Marzo/Abril 2023</a:t>
+              <a:t>Diplomatura en Ciencias Sociales Computacionales y Humanidades Digitales (IDAES-UNSAM</a:t>
             </a:r>
+            <a:r>
+              <a:rPr lang="es-AR"/>
+              <a:t>) </a:t>
+            </a:r>
+            <a:endParaRPr lang="es-AR" dirty="0"/>
           </a:p>
         </p:txBody>
       </p:sp>

</xml_diff>